<commit_message>
Changed webpage feature to WIP
</commit_message>
<xml_diff>
--- a/AutoDJ Pitch Presentation.pptx
+++ b/AutoDJ Pitch Presentation.pptx
@@ -109,6 +109,11 @@
       </a:defRPr>
     </a:lvl9pPr>
   </p:defaultTextStyle>
+  <p:extLst>
+    <p:ext uri="{EFAFB233-063F-42B5-8137-9DF3F51BA10A}">
+      <p15:sldGuideLst xmlns:p15="http://schemas.microsoft.com/office/powerpoint/2012/main"/>
+    </p:ext>
+  </p:extLst>
 </p:presentation>
 </file>
 
@@ -295,7 +300,7 @@
           <a:p>
             <a:fld id="{4AAD347D-5ACD-4C99-B74B-A9C85AD731AF}" type="datetimeFigureOut">
               <a:rPr lang="en-US" smtClean="0"/>
-              <a:t>1/22/2019</a:t>
+              <a:t>1/24/2019</a:t>
             </a:fld>
             <a:endParaRPr lang="en-US" dirty="0"/>
           </a:p>
@@ -570,7 +575,7 @@
           <a:p>
             <a:fld id="{4509A250-FF31-4206-8172-F9D3106AACB1}" type="datetimeFigureOut">
               <a:rPr lang="en-US" smtClean="0"/>
-              <a:t>1/22/2019</a:t>
+              <a:t>1/24/2019</a:t>
             </a:fld>
             <a:endParaRPr lang="en-US" dirty="0"/>
           </a:p>
@@ -764,7 +769,7 @@
           <a:p>
             <a:fld id="{4509A250-FF31-4206-8172-F9D3106AACB1}" type="datetimeFigureOut">
               <a:rPr lang="en-US" smtClean="0"/>
-              <a:t>1/22/2019</a:t>
+              <a:t>1/24/2019</a:t>
             </a:fld>
             <a:endParaRPr lang="en-US" dirty="0"/>
           </a:p>
@@ -1032,7 +1037,7 @@
           <a:p>
             <a:fld id="{4AAD347D-5ACD-4C99-B74B-A9C85AD731AF}" type="datetimeFigureOut">
               <a:rPr lang="en-US" smtClean="0"/>
-              <a:t>1/22/2019</a:t>
+              <a:t>1/24/2019</a:t>
             </a:fld>
             <a:endParaRPr lang="en-US" dirty="0"/>
           </a:p>
@@ -1365,7 +1370,7 @@
           <a:p>
             <a:fld id="{4509A250-FF31-4206-8172-F9D3106AACB1}" type="datetimeFigureOut">
               <a:rPr lang="en-US" smtClean="0"/>
-              <a:t>1/22/2019</a:t>
+              <a:t>1/24/2019</a:t>
             </a:fld>
             <a:endParaRPr lang="en-US" dirty="0"/>
           </a:p>
@@ -1975,7 +1980,7 @@
           <a:p>
             <a:fld id="{4509A250-FF31-4206-8172-F9D3106AACB1}" type="datetimeFigureOut">
               <a:rPr lang="en-US" smtClean="0"/>
-              <a:t>1/22/2019</a:t>
+              <a:t>1/24/2019</a:t>
             </a:fld>
             <a:endParaRPr lang="en-US" dirty="0"/>
           </a:p>
@@ -2822,7 +2827,7 @@
           <a:p>
             <a:fld id="{4509A250-FF31-4206-8172-F9D3106AACB1}" type="datetimeFigureOut">
               <a:rPr lang="en-US" smtClean="0"/>
-              <a:t>1/22/2019</a:t>
+              <a:t>1/24/2019</a:t>
             </a:fld>
             <a:endParaRPr lang="en-US" dirty="0"/>
           </a:p>
@@ -2992,7 +2997,7 @@
           <a:p>
             <a:fld id="{4509A250-FF31-4206-8172-F9D3106AACB1}" type="datetimeFigureOut">
               <a:rPr lang="en-US" smtClean="0"/>
-              <a:t>1/22/2019</a:t>
+              <a:t>1/24/2019</a:t>
             </a:fld>
             <a:endParaRPr lang="en-US" dirty="0"/>
           </a:p>
@@ -3172,7 +3177,7 @@
           <a:p>
             <a:fld id="{4509A250-FF31-4206-8172-F9D3106AACB1}" type="datetimeFigureOut">
               <a:rPr lang="en-US" smtClean="0"/>
-              <a:t>1/22/2019</a:t>
+              <a:t>1/24/2019</a:t>
             </a:fld>
             <a:endParaRPr lang="en-US" dirty="0"/>
           </a:p>
@@ -3342,7 +3347,7 @@
           <a:p>
             <a:fld id="{4509A250-FF31-4206-8172-F9D3106AACB1}" type="datetimeFigureOut">
               <a:rPr lang="en-US" smtClean="0"/>
-              <a:t>1/22/2019</a:t>
+              <a:t>1/24/2019</a:t>
             </a:fld>
             <a:endParaRPr lang="en-US" dirty="0"/>
           </a:p>
@@ -3586,7 +3591,7 @@
           <a:p>
             <a:fld id="{9796027F-7875-4030-9381-8BD8C4F21935}" type="datetimeFigureOut">
               <a:rPr lang="en-US" smtClean="0"/>
-              <a:t>1/22/2019</a:t>
+              <a:t>1/24/2019</a:t>
             </a:fld>
             <a:endParaRPr lang="en-US" dirty="0"/>
           </a:p>
@@ -3878,7 +3883,7 @@
           <a:p>
             <a:fld id="{9796027F-7875-4030-9381-8BD8C4F21935}" type="datetimeFigureOut">
               <a:rPr lang="en-US" smtClean="0"/>
-              <a:t>1/22/2019</a:t>
+              <a:t>1/24/2019</a:t>
             </a:fld>
             <a:endParaRPr lang="en-US" dirty="0"/>
           </a:p>
@@ -4316,7 +4321,7 @@
           <a:p>
             <a:fld id="{9796027F-7875-4030-9381-8BD8C4F21935}" type="datetimeFigureOut">
               <a:rPr lang="en-US" smtClean="0"/>
-              <a:t>1/22/2019</a:t>
+              <a:t>1/24/2019</a:t>
             </a:fld>
             <a:endParaRPr lang="en-US" dirty="0"/>
           </a:p>
@@ -4434,7 +4439,7 @@
           <a:p>
             <a:fld id="{4509A250-FF31-4206-8172-F9D3106AACB1}" type="datetimeFigureOut">
               <a:rPr lang="en-US" smtClean="0"/>
-              <a:t>1/22/2019</a:t>
+              <a:t>1/24/2019</a:t>
             </a:fld>
             <a:endParaRPr lang="en-US" dirty="0"/>
           </a:p>
@@ -4529,7 +4534,7 @@
           <a:p>
             <a:fld id="{4509A250-FF31-4206-8172-F9D3106AACB1}" type="datetimeFigureOut">
               <a:rPr lang="en-US" smtClean="0"/>
-              <a:t>1/22/2019</a:t>
+              <a:t>1/24/2019</a:t>
             </a:fld>
             <a:endParaRPr lang="en-US" dirty="0"/>
           </a:p>
@@ -4808,7 +4813,7 @@
           <a:p>
             <a:fld id="{4509A250-FF31-4206-8172-F9D3106AACB1}" type="datetimeFigureOut">
               <a:rPr lang="en-US" smtClean="0"/>
-              <a:t>1/22/2019</a:t>
+              <a:t>1/24/2019</a:t>
             </a:fld>
             <a:endParaRPr lang="en-US" dirty="0"/>
           </a:p>
@@ -5083,7 +5088,7 @@
           <a:p>
             <a:fld id="{4509A250-FF31-4206-8172-F9D3106AACB1}" type="datetimeFigureOut">
               <a:rPr lang="en-US" smtClean="0"/>
-              <a:t>1/22/2019</a:t>
+              <a:t>1/24/2019</a:t>
             </a:fld>
             <a:endParaRPr lang="en-US" dirty="0"/>
           </a:p>
@@ -5512,7 +5517,7 @@
           <a:p>
             <a:fld id="{4AAD347D-5ACD-4C99-B74B-A9C85AD731AF}" type="datetimeFigureOut">
               <a:rPr lang="en-US" smtClean="0"/>
-              <a:t>1/22/2019</a:t>
+              <a:t>1/24/2019</a:t>
             </a:fld>
             <a:endParaRPr lang="en-US" dirty="0"/>
           </a:p>
@@ -8005,8 +8010,8 @@
         </p:nvSpPr>
         <p:spPr>
           <a:xfrm>
-            <a:off x="1103312" y="2763520"/>
-            <a:ext cx="10214045" cy="3484879"/>
+            <a:off x="1103312" y="2452350"/>
+            <a:ext cx="10214045" cy="3796050"/>
           </a:xfrm>
         </p:spPr>
         <p:txBody>
@@ -8052,7 +8057,7 @@
                 <a:latin typeface="Cambria" panose="02040503050406030204" pitchFamily="18" charset="0"/>
                 <a:ea typeface="Cambria" panose="02040503050406030204" pitchFamily="18" charset="0"/>
               </a:rPr>
-              <a:t> will also be able to generate appropriate playlists based on the webpage a user is currently visiting.</a:t>
+              <a:t> will also be able to generate appropriate playlists based on any set of user input text, pulling appropriate concepts and themes to generate music.</a:t>
             </a:r>
           </a:p>
           <a:p>
@@ -8061,7 +8066,7 @@
                 <a:latin typeface="Cambria" panose="02040503050406030204" pitchFamily="18" charset="0"/>
                 <a:ea typeface="Cambria" panose="02040503050406030204" pitchFamily="18" charset="0"/>
               </a:rPr>
-              <a:t>The song currently playing will be dynamically changed as the user navigates through the web, gradually transitioning as the user accesses new webpages.</a:t>
+              <a:t>In the future the application will be able to dynamically play music as the user navigates through the web, gradually transitioning songs as the user accesses new webpages.</a:t>
             </a:r>
           </a:p>
           <a:p>

</xml_diff>